<commit_message>
Update presentation, model (EDA2)
</commit_message>
<xml_diff>
--- a/presentation/DATA7001_Group8_Presentation_CJRS_21.10.2020.pptx
+++ b/presentation/DATA7001_Group8_Presentation_CJRS_21.10.2020.pptx
@@ -5,7 +5,7 @@
     <p:sldMasterId id="2147483725" r:id="rId1"/>
   </p:sldMasterIdLst>
   <p:notesMasterIdLst>
-    <p:notesMasterId r:id="rId13"/>
+    <p:notesMasterId r:id="rId19"/>
   </p:notesMasterIdLst>
   <p:sldIdLst>
     <p:sldId id="256" r:id="rId2"/>
@@ -14,11 +14,17 @@
     <p:sldId id="259" r:id="rId5"/>
     <p:sldId id="260" r:id="rId6"/>
     <p:sldId id="261" r:id="rId7"/>
-    <p:sldId id="262" r:id="rId8"/>
-    <p:sldId id="263" r:id="rId9"/>
-    <p:sldId id="264" r:id="rId10"/>
-    <p:sldId id="265" r:id="rId11"/>
-    <p:sldId id="266" r:id="rId12"/>
+    <p:sldId id="271" r:id="rId8"/>
+    <p:sldId id="262" r:id="rId9"/>
+    <p:sldId id="267" r:id="rId10"/>
+    <p:sldId id="268" r:id="rId11"/>
+    <p:sldId id="269" r:id="rId12"/>
+    <p:sldId id="270" r:id="rId13"/>
+    <p:sldId id="272" r:id="rId14"/>
+    <p:sldId id="263" r:id="rId15"/>
+    <p:sldId id="264" r:id="rId16"/>
+    <p:sldId id="265" r:id="rId17"/>
+    <p:sldId id="266" r:id="rId18"/>
   </p:sldIdLst>
   <p:sldSz cx="12192000" cy="6858000"/>
   <p:notesSz cx="6858000" cy="9144000"/>
@@ -117,6 +123,14 @@
       </a:defRPr>
     </a:lvl9pPr>
   </p:defaultTextStyle>
+  <p:extLst>
+    <p:ext uri="{EFAFB233-063F-42B5-8137-9DF3F51BA10A}">
+      <p15:sldGuideLst xmlns:p15="http://schemas.microsoft.com/office/powerpoint/2012/main"/>
+    </p:ext>
+    <p:ext uri="{2D200454-40CA-4A62-9FC3-DE9A4176ACB9}">
+      <p15:notesGuideLst xmlns:p15="http://schemas.microsoft.com/office/powerpoint/2012/main"/>
+    </p:ext>
+  </p:extLst>
 </p:presentation>
 </file>
 
@@ -202,7 +216,7 @@
           <a:p>
             <a:fld id="{EA0EA7B9-5A74-FC46-8708-F4354ADAA4DA}" type="datetimeFigureOut">
               <a:rPr lang="en-US" smtClean="0"/>
-              <a:t>10/21/20</a:t>
+              <a:t>10/25/2020</a:t>
             </a:fld>
             <a:endParaRPr lang="en-US"/>
           </a:p>
@@ -637,7 +651,7 @@
             </a:pPr>
             <a:r>
               <a:rPr lang="en-US" dirty="0"/>
-              <a:t>Planned duration for this slide: 0:15.</a:t>
+              <a:t>Planned duration for this slide: 1:00.</a:t>
             </a:r>
           </a:p>
         </p:txBody>
@@ -668,7 +682,7 @@
     </p:spTree>
     <p:extLst>
       <p:ext uri="{BB962C8B-B14F-4D97-AF65-F5344CB8AC3E}">
-        <p14:creationId xmlns:p14="http://schemas.microsoft.com/office/powerpoint/2010/main" val="2068167583"/>
+        <p14:creationId xmlns:p14="http://schemas.microsoft.com/office/powerpoint/2010/main" val="3737399975"/>
       </p:ext>
     </p:extLst>
   </p:cSld>
@@ -741,7 +755,7 @@
             </a:pPr>
             <a:r>
               <a:rPr lang="en-US" dirty="0"/>
-              <a:t>Planned duration for this slide: 0:00.</a:t>
+              <a:t>Planned duration for this slide: 1:00.</a:t>
             </a:r>
           </a:p>
         </p:txBody>
@@ -764,6 +778,630 @@
             <a:fld id="{61275796-9351-FE43-A381-93AD2263741D}" type="slidenum">
               <a:rPr lang="en-US" smtClean="0"/>
               <a:t>11</a:t>
+            </a:fld>
+            <a:endParaRPr lang="en-US"/>
+          </a:p>
+        </p:txBody>
+      </p:sp>
+    </p:spTree>
+    <p:extLst>
+      <p:ext uri="{BB962C8B-B14F-4D97-AF65-F5344CB8AC3E}">
+        <p14:creationId xmlns:p14="http://schemas.microsoft.com/office/powerpoint/2010/main" val="1748330986"/>
+      </p:ext>
+    </p:extLst>
+  </p:cSld>
+  <p:clrMapOvr>
+    <a:masterClrMapping/>
+  </p:clrMapOvr>
+</p:notes>
+</file>
+
+<file path=ppt/notesSlides/notesSlide12.xml><?xml version="1.0" encoding="utf-8"?>
+<p:notes xmlns:a="http://schemas.openxmlformats.org/drawingml/2006/main" xmlns:r="http://schemas.openxmlformats.org/officeDocument/2006/relationships" xmlns:p="http://schemas.openxmlformats.org/presentationml/2006/main">
+  <p:cSld>
+    <p:spTree>
+      <p:nvGrpSpPr>
+        <p:cNvPr id="1" name=""/>
+        <p:cNvGrpSpPr/>
+        <p:nvPr/>
+      </p:nvGrpSpPr>
+      <p:grpSpPr>
+        <a:xfrm>
+          <a:off x="0" y="0"/>
+          <a:ext cx="0" cy="0"/>
+          <a:chOff x="0" y="0"/>
+          <a:chExt cx="0" cy="0"/>
+        </a:xfrm>
+      </p:grpSpPr>
+      <p:sp>
+        <p:nvSpPr>
+          <p:cNvPr id="2" name="Slide Image Placeholder 1"/>
+          <p:cNvSpPr>
+            <a:spLocks noGrp="1" noRot="1" noChangeAspect="1"/>
+          </p:cNvSpPr>
+          <p:nvPr>
+            <p:ph type="sldImg"/>
+          </p:nvPr>
+        </p:nvSpPr>
+        <p:spPr/>
+      </p:sp>
+      <p:sp>
+        <p:nvSpPr>
+          <p:cNvPr id="3" name="Notes Placeholder 2"/>
+          <p:cNvSpPr>
+            <a:spLocks noGrp="1"/>
+          </p:cNvSpPr>
+          <p:nvPr>
+            <p:ph type="body" idx="1"/>
+          </p:nvPr>
+        </p:nvSpPr>
+        <p:spPr/>
+        <p:txBody>
+          <a:bodyPr/>
+          <a:lstStyle/>
+          <a:p>
+            <a:pPr marL="0" marR="0" lvl="0" indent="0" algn="l" defTabSz="914400" rtl="0" eaLnBrk="1" fontAlgn="auto" latinLnBrk="0" hangingPunct="1">
+              <a:lnSpc>
+                <a:spcPct val="100000"/>
+              </a:lnSpc>
+              <a:spcBef>
+                <a:spcPts val="0"/>
+              </a:spcBef>
+              <a:spcAft>
+                <a:spcPts val="0"/>
+              </a:spcAft>
+              <a:buClrTx/>
+              <a:buSzTx/>
+              <a:buFontTx/>
+              <a:buNone/>
+              <a:tabLst/>
+              <a:defRPr/>
+            </a:pPr>
+            <a:r>
+              <a:rPr lang="en-US" dirty="0"/>
+              <a:t>Planned duration for this slide: 1:00.</a:t>
+            </a:r>
+          </a:p>
+        </p:txBody>
+      </p:sp>
+      <p:sp>
+        <p:nvSpPr>
+          <p:cNvPr id="4" name="Slide Number Placeholder 3"/>
+          <p:cNvSpPr>
+            <a:spLocks noGrp="1"/>
+          </p:cNvSpPr>
+          <p:nvPr>
+            <p:ph type="sldNum" sz="quarter" idx="5"/>
+          </p:nvPr>
+        </p:nvSpPr>
+        <p:spPr/>
+        <p:txBody>
+          <a:bodyPr/>
+          <a:lstStyle/>
+          <a:p>
+            <a:fld id="{61275796-9351-FE43-A381-93AD2263741D}" type="slidenum">
+              <a:rPr lang="en-US" smtClean="0"/>
+              <a:t>12</a:t>
+            </a:fld>
+            <a:endParaRPr lang="en-US"/>
+          </a:p>
+        </p:txBody>
+      </p:sp>
+    </p:spTree>
+    <p:extLst>
+      <p:ext uri="{BB962C8B-B14F-4D97-AF65-F5344CB8AC3E}">
+        <p14:creationId xmlns:p14="http://schemas.microsoft.com/office/powerpoint/2010/main" val="711617044"/>
+      </p:ext>
+    </p:extLst>
+  </p:cSld>
+  <p:clrMapOvr>
+    <a:masterClrMapping/>
+  </p:clrMapOvr>
+</p:notes>
+</file>
+
+<file path=ppt/notesSlides/notesSlide13.xml><?xml version="1.0" encoding="utf-8"?>
+<p:notes xmlns:a="http://schemas.openxmlformats.org/drawingml/2006/main" xmlns:r="http://schemas.openxmlformats.org/officeDocument/2006/relationships" xmlns:p="http://schemas.openxmlformats.org/presentationml/2006/main">
+  <p:cSld>
+    <p:spTree>
+      <p:nvGrpSpPr>
+        <p:cNvPr id="1" name=""/>
+        <p:cNvGrpSpPr/>
+        <p:nvPr/>
+      </p:nvGrpSpPr>
+      <p:grpSpPr>
+        <a:xfrm>
+          <a:off x="0" y="0"/>
+          <a:ext cx="0" cy="0"/>
+          <a:chOff x="0" y="0"/>
+          <a:chExt cx="0" cy="0"/>
+        </a:xfrm>
+      </p:grpSpPr>
+      <p:sp>
+        <p:nvSpPr>
+          <p:cNvPr id="2" name="Slide Image Placeholder 1"/>
+          <p:cNvSpPr>
+            <a:spLocks noGrp="1" noRot="1" noChangeAspect="1"/>
+          </p:cNvSpPr>
+          <p:nvPr>
+            <p:ph type="sldImg"/>
+          </p:nvPr>
+        </p:nvSpPr>
+        <p:spPr/>
+      </p:sp>
+      <p:sp>
+        <p:nvSpPr>
+          <p:cNvPr id="3" name="Notes Placeholder 2"/>
+          <p:cNvSpPr>
+            <a:spLocks noGrp="1"/>
+          </p:cNvSpPr>
+          <p:nvPr>
+            <p:ph type="body" idx="1"/>
+          </p:nvPr>
+        </p:nvSpPr>
+        <p:spPr/>
+        <p:txBody>
+          <a:bodyPr/>
+          <a:lstStyle/>
+          <a:p>
+            <a:pPr marL="0" marR="0" lvl="0" indent="0" algn="l" defTabSz="914400" rtl="0" eaLnBrk="1" fontAlgn="auto" latinLnBrk="0" hangingPunct="1">
+              <a:lnSpc>
+                <a:spcPct val="100000"/>
+              </a:lnSpc>
+              <a:spcBef>
+                <a:spcPts val="0"/>
+              </a:spcBef>
+              <a:spcAft>
+                <a:spcPts val="0"/>
+              </a:spcAft>
+              <a:buClrTx/>
+              <a:buSzTx/>
+              <a:buFontTx/>
+              <a:buNone/>
+              <a:tabLst/>
+              <a:defRPr/>
+            </a:pPr>
+            <a:r>
+              <a:rPr lang="en-US" dirty="0"/>
+              <a:t>Planned duration for this slide: 1:00.</a:t>
+            </a:r>
+          </a:p>
+        </p:txBody>
+      </p:sp>
+      <p:sp>
+        <p:nvSpPr>
+          <p:cNvPr id="4" name="Slide Number Placeholder 3"/>
+          <p:cNvSpPr>
+            <a:spLocks noGrp="1"/>
+          </p:cNvSpPr>
+          <p:nvPr>
+            <p:ph type="sldNum" sz="quarter" idx="5"/>
+          </p:nvPr>
+        </p:nvSpPr>
+        <p:spPr/>
+        <p:txBody>
+          <a:bodyPr/>
+          <a:lstStyle/>
+          <a:p>
+            <a:fld id="{61275796-9351-FE43-A381-93AD2263741D}" type="slidenum">
+              <a:rPr lang="en-US" smtClean="0"/>
+              <a:t>13</a:t>
+            </a:fld>
+            <a:endParaRPr lang="en-US"/>
+          </a:p>
+        </p:txBody>
+      </p:sp>
+    </p:spTree>
+    <p:extLst>
+      <p:ext uri="{BB962C8B-B14F-4D97-AF65-F5344CB8AC3E}">
+        <p14:creationId xmlns:p14="http://schemas.microsoft.com/office/powerpoint/2010/main" val="51496147"/>
+      </p:ext>
+    </p:extLst>
+  </p:cSld>
+  <p:clrMapOvr>
+    <a:masterClrMapping/>
+  </p:clrMapOvr>
+</p:notes>
+</file>
+
+<file path=ppt/notesSlides/notesSlide14.xml><?xml version="1.0" encoding="utf-8"?>
+<p:notes xmlns:a="http://schemas.openxmlformats.org/drawingml/2006/main" xmlns:r="http://schemas.openxmlformats.org/officeDocument/2006/relationships" xmlns:p="http://schemas.openxmlformats.org/presentationml/2006/main">
+  <p:cSld>
+    <p:spTree>
+      <p:nvGrpSpPr>
+        <p:cNvPr id="1" name=""/>
+        <p:cNvGrpSpPr/>
+        <p:nvPr/>
+      </p:nvGrpSpPr>
+      <p:grpSpPr>
+        <a:xfrm>
+          <a:off x="0" y="0"/>
+          <a:ext cx="0" cy="0"/>
+          <a:chOff x="0" y="0"/>
+          <a:chExt cx="0" cy="0"/>
+        </a:xfrm>
+      </p:grpSpPr>
+      <p:sp>
+        <p:nvSpPr>
+          <p:cNvPr id="2" name="Slide Image Placeholder 1"/>
+          <p:cNvSpPr>
+            <a:spLocks noGrp="1" noRot="1" noChangeAspect="1"/>
+          </p:cNvSpPr>
+          <p:nvPr>
+            <p:ph type="sldImg"/>
+          </p:nvPr>
+        </p:nvSpPr>
+        <p:spPr/>
+      </p:sp>
+      <p:sp>
+        <p:nvSpPr>
+          <p:cNvPr id="3" name="Notes Placeholder 2"/>
+          <p:cNvSpPr>
+            <a:spLocks noGrp="1"/>
+          </p:cNvSpPr>
+          <p:nvPr>
+            <p:ph type="body" idx="1"/>
+          </p:nvPr>
+        </p:nvSpPr>
+        <p:spPr/>
+        <p:txBody>
+          <a:bodyPr/>
+          <a:lstStyle/>
+          <a:p>
+            <a:pPr marL="0" marR="0" lvl="0" indent="0" algn="l" defTabSz="914400" rtl="0" eaLnBrk="1" fontAlgn="auto" latinLnBrk="0" hangingPunct="1">
+              <a:lnSpc>
+                <a:spcPct val="100000"/>
+              </a:lnSpc>
+              <a:spcBef>
+                <a:spcPts val="0"/>
+              </a:spcBef>
+              <a:spcAft>
+                <a:spcPts val="0"/>
+              </a:spcAft>
+              <a:buClrTx/>
+              <a:buSzTx/>
+              <a:buFontTx/>
+              <a:buNone/>
+              <a:tabLst/>
+              <a:defRPr/>
+            </a:pPr>
+            <a:r>
+              <a:rPr lang="en-US" dirty="0"/>
+              <a:t>Planned duration for this item: 2:00.</a:t>
+            </a:r>
+          </a:p>
+        </p:txBody>
+      </p:sp>
+      <p:sp>
+        <p:nvSpPr>
+          <p:cNvPr id="4" name="Slide Number Placeholder 3"/>
+          <p:cNvSpPr>
+            <a:spLocks noGrp="1"/>
+          </p:cNvSpPr>
+          <p:nvPr>
+            <p:ph type="sldNum" sz="quarter" idx="5"/>
+          </p:nvPr>
+        </p:nvSpPr>
+        <p:spPr/>
+        <p:txBody>
+          <a:bodyPr/>
+          <a:lstStyle/>
+          <a:p>
+            <a:fld id="{61275796-9351-FE43-A381-93AD2263741D}" type="slidenum">
+              <a:rPr lang="en-US" smtClean="0"/>
+              <a:t>14</a:t>
+            </a:fld>
+            <a:endParaRPr lang="en-US"/>
+          </a:p>
+        </p:txBody>
+      </p:sp>
+    </p:spTree>
+    <p:extLst>
+      <p:ext uri="{BB962C8B-B14F-4D97-AF65-F5344CB8AC3E}">
+        <p14:creationId xmlns:p14="http://schemas.microsoft.com/office/powerpoint/2010/main" val="1409910602"/>
+      </p:ext>
+    </p:extLst>
+  </p:cSld>
+  <p:clrMapOvr>
+    <a:masterClrMapping/>
+  </p:clrMapOvr>
+</p:notes>
+</file>
+
+<file path=ppt/notesSlides/notesSlide15.xml><?xml version="1.0" encoding="utf-8"?>
+<p:notes xmlns:a="http://schemas.openxmlformats.org/drawingml/2006/main" xmlns:r="http://schemas.openxmlformats.org/officeDocument/2006/relationships" xmlns:p="http://schemas.openxmlformats.org/presentationml/2006/main">
+  <p:cSld>
+    <p:spTree>
+      <p:nvGrpSpPr>
+        <p:cNvPr id="1" name=""/>
+        <p:cNvGrpSpPr/>
+        <p:nvPr/>
+      </p:nvGrpSpPr>
+      <p:grpSpPr>
+        <a:xfrm>
+          <a:off x="0" y="0"/>
+          <a:ext cx="0" cy="0"/>
+          <a:chOff x="0" y="0"/>
+          <a:chExt cx="0" cy="0"/>
+        </a:xfrm>
+      </p:grpSpPr>
+      <p:sp>
+        <p:nvSpPr>
+          <p:cNvPr id="2" name="Slide Image Placeholder 1"/>
+          <p:cNvSpPr>
+            <a:spLocks noGrp="1" noRot="1" noChangeAspect="1"/>
+          </p:cNvSpPr>
+          <p:nvPr>
+            <p:ph type="sldImg"/>
+          </p:nvPr>
+        </p:nvSpPr>
+        <p:spPr/>
+      </p:sp>
+      <p:sp>
+        <p:nvSpPr>
+          <p:cNvPr id="3" name="Notes Placeholder 2"/>
+          <p:cNvSpPr>
+            <a:spLocks noGrp="1"/>
+          </p:cNvSpPr>
+          <p:nvPr>
+            <p:ph type="body" idx="1"/>
+          </p:nvPr>
+        </p:nvSpPr>
+        <p:spPr/>
+        <p:txBody>
+          <a:bodyPr/>
+          <a:lstStyle/>
+          <a:p>
+            <a:pPr marL="0" marR="0" lvl="0" indent="0" algn="l" defTabSz="914400" rtl="0" eaLnBrk="1" fontAlgn="auto" latinLnBrk="0" hangingPunct="1">
+              <a:lnSpc>
+                <a:spcPct val="100000"/>
+              </a:lnSpc>
+              <a:spcBef>
+                <a:spcPts val="0"/>
+              </a:spcBef>
+              <a:spcAft>
+                <a:spcPts val="0"/>
+              </a:spcAft>
+              <a:buClrTx/>
+              <a:buSzTx/>
+              <a:buFontTx/>
+              <a:buNone/>
+              <a:tabLst/>
+              <a:defRPr/>
+            </a:pPr>
+            <a:r>
+              <a:rPr lang="en-US" dirty="0"/>
+              <a:t>Planned duration for this slide: 0:30.</a:t>
+            </a:r>
+          </a:p>
+        </p:txBody>
+      </p:sp>
+      <p:sp>
+        <p:nvSpPr>
+          <p:cNvPr id="4" name="Slide Number Placeholder 3"/>
+          <p:cNvSpPr>
+            <a:spLocks noGrp="1"/>
+          </p:cNvSpPr>
+          <p:nvPr>
+            <p:ph type="sldNum" sz="quarter" idx="5"/>
+          </p:nvPr>
+        </p:nvSpPr>
+        <p:spPr/>
+        <p:txBody>
+          <a:bodyPr/>
+          <a:lstStyle/>
+          <a:p>
+            <a:fld id="{61275796-9351-FE43-A381-93AD2263741D}" type="slidenum">
+              <a:rPr lang="en-US" smtClean="0"/>
+              <a:t>15</a:t>
+            </a:fld>
+            <a:endParaRPr lang="en-US"/>
+          </a:p>
+        </p:txBody>
+      </p:sp>
+    </p:spTree>
+    <p:extLst>
+      <p:ext uri="{BB962C8B-B14F-4D97-AF65-F5344CB8AC3E}">
+        <p14:creationId xmlns:p14="http://schemas.microsoft.com/office/powerpoint/2010/main" val="243972615"/>
+      </p:ext>
+    </p:extLst>
+  </p:cSld>
+  <p:clrMapOvr>
+    <a:masterClrMapping/>
+  </p:clrMapOvr>
+</p:notes>
+</file>
+
+<file path=ppt/notesSlides/notesSlide16.xml><?xml version="1.0" encoding="utf-8"?>
+<p:notes xmlns:a="http://schemas.openxmlformats.org/drawingml/2006/main" xmlns:r="http://schemas.openxmlformats.org/officeDocument/2006/relationships" xmlns:p="http://schemas.openxmlformats.org/presentationml/2006/main">
+  <p:cSld>
+    <p:spTree>
+      <p:nvGrpSpPr>
+        <p:cNvPr id="1" name=""/>
+        <p:cNvGrpSpPr/>
+        <p:nvPr/>
+      </p:nvGrpSpPr>
+      <p:grpSpPr>
+        <a:xfrm>
+          <a:off x="0" y="0"/>
+          <a:ext cx="0" cy="0"/>
+          <a:chOff x="0" y="0"/>
+          <a:chExt cx="0" cy="0"/>
+        </a:xfrm>
+      </p:grpSpPr>
+      <p:sp>
+        <p:nvSpPr>
+          <p:cNvPr id="2" name="Slide Image Placeholder 1"/>
+          <p:cNvSpPr>
+            <a:spLocks noGrp="1" noRot="1" noChangeAspect="1"/>
+          </p:cNvSpPr>
+          <p:nvPr>
+            <p:ph type="sldImg"/>
+          </p:nvPr>
+        </p:nvSpPr>
+        <p:spPr/>
+      </p:sp>
+      <p:sp>
+        <p:nvSpPr>
+          <p:cNvPr id="3" name="Notes Placeholder 2"/>
+          <p:cNvSpPr>
+            <a:spLocks noGrp="1"/>
+          </p:cNvSpPr>
+          <p:nvPr>
+            <p:ph type="body" idx="1"/>
+          </p:nvPr>
+        </p:nvSpPr>
+        <p:spPr/>
+        <p:txBody>
+          <a:bodyPr/>
+          <a:lstStyle/>
+          <a:p>
+            <a:pPr marL="0" marR="0" lvl="0" indent="0" algn="l" defTabSz="914400" rtl="0" eaLnBrk="1" fontAlgn="auto" latinLnBrk="0" hangingPunct="1">
+              <a:lnSpc>
+                <a:spcPct val="100000"/>
+              </a:lnSpc>
+              <a:spcBef>
+                <a:spcPts val="0"/>
+              </a:spcBef>
+              <a:spcAft>
+                <a:spcPts val="0"/>
+              </a:spcAft>
+              <a:buClrTx/>
+              <a:buSzTx/>
+              <a:buFontTx/>
+              <a:buNone/>
+              <a:tabLst/>
+              <a:defRPr/>
+            </a:pPr>
+            <a:r>
+              <a:rPr lang="en-US" dirty="0"/>
+              <a:t>Planned duration for this slide: 0:15.</a:t>
+            </a:r>
+          </a:p>
+        </p:txBody>
+      </p:sp>
+      <p:sp>
+        <p:nvSpPr>
+          <p:cNvPr id="4" name="Slide Number Placeholder 3"/>
+          <p:cNvSpPr>
+            <a:spLocks noGrp="1"/>
+          </p:cNvSpPr>
+          <p:nvPr>
+            <p:ph type="sldNum" sz="quarter" idx="5"/>
+          </p:nvPr>
+        </p:nvSpPr>
+        <p:spPr/>
+        <p:txBody>
+          <a:bodyPr/>
+          <a:lstStyle/>
+          <a:p>
+            <a:fld id="{61275796-9351-FE43-A381-93AD2263741D}" type="slidenum">
+              <a:rPr lang="en-US" smtClean="0"/>
+              <a:t>16</a:t>
+            </a:fld>
+            <a:endParaRPr lang="en-US"/>
+          </a:p>
+        </p:txBody>
+      </p:sp>
+    </p:spTree>
+    <p:extLst>
+      <p:ext uri="{BB962C8B-B14F-4D97-AF65-F5344CB8AC3E}">
+        <p14:creationId xmlns:p14="http://schemas.microsoft.com/office/powerpoint/2010/main" val="2068167583"/>
+      </p:ext>
+    </p:extLst>
+  </p:cSld>
+  <p:clrMapOvr>
+    <a:masterClrMapping/>
+  </p:clrMapOvr>
+</p:notes>
+</file>
+
+<file path=ppt/notesSlides/notesSlide17.xml><?xml version="1.0" encoding="utf-8"?>
+<p:notes xmlns:a="http://schemas.openxmlformats.org/drawingml/2006/main" xmlns:r="http://schemas.openxmlformats.org/officeDocument/2006/relationships" xmlns:p="http://schemas.openxmlformats.org/presentationml/2006/main">
+  <p:cSld>
+    <p:spTree>
+      <p:nvGrpSpPr>
+        <p:cNvPr id="1" name=""/>
+        <p:cNvGrpSpPr/>
+        <p:nvPr/>
+      </p:nvGrpSpPr>
+      <p:grpSpPr>
+        <a:xfrm>
+          <a:off x="0" y="0"/>
+          <a:ext cx="0" cy="0"/>
+          <a:chOff x="0" y="0"/>
+          <a:chExt cx="0" cy="0"/>
+        </a:xfrm>
+      </p:grpSpPr>
+      <p:sp>
+        <p:nvSpPr>
+          <p:cNvPr id="2" name="Slide Image Placeholder 1"/>
+          <p:cNvSpPr>
+            <a:spLocks noGrp="1" noRot="1" noChangeAspect="1"/>
+          </p:cNvSpPr>
+          <p:nvPr>
+            <p:ph type="sldImg"/>
+          </p:nvPr>
+        </p:nvSpPr>
+        <p:spPr/>
+      </p:sp>
+      <p:sp>
+        <p:nvSpPr>
+          <p:cNvPr id="3" name="Notes Placeholder 2"/>
+          <p:cNvSpPr>
+            <a:spLocks noGrp="1"/>
+          </p:cNvSpPr>
+          <p:nvPr>
+            <p:ph type="body" idx="1"/>
+          </p:nvPr>
+        </p:nvSpPr>
+        <p:spPr/>
+        <p:txBody>
+          <a:bodyPr/>
+          <a:lstStyle/>
+          <a:p>
+            <a:pPr marL="0" marR="0" lvl="0" indent="0" algn="l" defTabSz="914400" rtl="0" eaLnBrk="1" fontAlgn="auto" latinLnBrk="0" hangingPunct="1">
+              <a:lnSpc>
+                <a:spcPct val="100000"/>
+              </a:lnSpc>
+              <a:spcBef>
+                <a:spcPts val="0"/>
+              </a:spcBef>
+              <a:spcAft>
+                <a:spcPts val="0"/>
+              </a:spcAft>
+              <a:buClrTx/>
+              <a:buSzTx/>
+              <a:buFontTx/>
+              <a:buNone/>
+              <a:tabLst/>
+              <a:defRPr/>
+            </a:pPr>
+            <a:r>
+              <a:rPr lang="en-US" dirty="0"/>
+              <a:t>Planned duration for this slide: 0:00.</a:t>
+            </a:r>
+          </a:p>
+        </p:txBody>
+      </p:sp>
+      <p:sp>
+        <p:nvSpPr>
+          <p:cNvPr id="4" name="Slide Number Placeholder 3"/>
+          <p:cNvSpPr>
+            <a:spLocks noGrp="1"/>
+          </p:cNvSpPr>
+          <p:nvPr>
+            <p:ph type="sldNum" sz="quarter" idx="5"/>
+          </p:nvPr>
+        </p:nvSpPr>
+        <p:spPr/>
+        <p:txBody>
+          <a:bodyPr/>
+          <a:lstStyle/>
+          <a:p>
+            <a:fld id="{61275796-9351-FE43-A381-93AD2263741D}" type="slidenum">
+              <a:rPr lang="en-US" smtClean="0"/>
+              <a:t>17</a:t>
             </a:fld>
             <a:endParaRPr lang="en-US"/>
           </a:p>
@@ -1401,7 +2039,7 @@
     </p:spTree>
     <p:extLst>
       <p:ext uri="{BB962C8B-B14F-4D97-AF65-F5344CB8AC3E}">
-        <p14:creationId xmlns:p14="http://schemas.microsoft.com/office/powerpoint/2010/main" val="1315779538"/>
+        <p14:creationId xmlns:p14="http://schemas.microsoft.com/office/powerpoint/2010/main" val="3551938644"/>
       </p:ext>
     </p:extLst>
   </p:cSld>
@@ -1474,7 +2112,7 @@
             </a:pPr>
             <a:r>
               <a:rPr lang="en-US" dirty="0"/>
-              <a:t>Planned duration for this item: 2:00.</a:t>
+              <a:t>Planned duration for this slide: 1:00.</a:t>
             </a:r>
           </a:p>
         </p:txBody>
@@ -1505,7 +2143,7 @@
     </p:spTree>
     <p:extLst>
       <p:ext uri="{BB962C8B-B14F-4D97-AF65-F5344CB8AC3E}">
-        <p14:creationId xmlns:p14="http://schemas.microsoft.com/office/powerpoint/2010/main" val="1409910602"/>
+        <p14:creationId xmlns:p14="http://schemas.microsoft.com/office/powerpoint/2010/main" val="1315779538"/>
       </p:ext>
     </p:extLst>
   </p:cSld>
@@ -1578,7 +2216,7 @@
             </a:pPr>
             <a:r>
               <a:rPr lang="en-US" dirty="0"/>
-              <a:t>Planned duration for this slide: 0:30.</a:t>
+              <a:t>Planned duration for this slide: 1:00.</a:t>
             </a:r>
           </a:p>
         </p:txBody>
@@ -1609,7 +2247,7 @@
     </p:spTree>
     <p:extLst>
       <p:ext uri="{BB962C8B-B14F-4D97-AF65-F5344CB8AC3E}">
-        <p14:creationId xmlns:p14="http://schemas.microsoft.com/office/powerpoint/2010/main" val="243972615"/>
+        <p14:creationId xmlns:p14="http://schemas.microsoft.com/office/powerpoint/2010/main" val="2473888449"/>
       </p:ext>
     </p:extLst>
   </p:cSld>
@@ -1775,7 +2413,7 @@
           <a:p>
             <a:fld id="{02AC24A9-CCB6-4F8D-B8DB-C2F3692CFA5A}" type="datetimeFigureOut">
               <a:rPr lang="en-US" smtClean="0"/>
-              <a:t>10/21/20</a:t>
+              <a:t>10/25/2020</a:t>
             </a:fld>
             <a:endParaRPr lang="en-US" dirty="0"/>
           </a:p>
@@ -2145,7 +2783,7 @@
           <a:p>
             <a:fld id="{02AC24A9-CCB6-4F8D-B8DB-C2F3692CFA5A}" type="datetimeFigureOut">
               <a:rPr lang="en-US" smtClean="0"/>
-              <a:t>10/21/20</a:t>
+              <a:t>10/25/2020</a:t>
             </a:fld>
             <a:endParaRPr lang="en-US"/>
           </a:p>
@@ -2354,7 +2992,7 @@
           <a:p>
             <a:fld id="{02AC24A9-CCB6-4F8D-B8DB-C2F3692CFA5A}" type="datetimeFigureOut">
               <a:rPr lang="en-US" smtClean="0"/>
-              <a:t>10/21/20</a:t>
+              <a:t>10/25/2020</a:t>
             </a:fld>
             <a:endParaRPr lang="en-US"/>
           </a:p>
@@ -2824,7 +3462,7 @@
           <a:p>
             <a:fld id="{02AC24A9-CCB6-4F8D-B8DB-C2F3692CFA5A}" type="datetimeFigureOut">
               <a:rPr lang="en-US" smtClean="0"/>
-              <a:t>10/21/20</a:t>
+              <a:t>10/25/2020</a:t>
             </a:fld>
             <a:endParaRPr lang="en-US"/>
           </a:p>
@@ -3278,7 +3916,7 @@
           <a:p>
             <a:fld id="{02AC24A9-CCB6-4F8D-B8DB-C2F3692CFA5A}" type="datetimeFigureOut">
               <a:rPr lang="en-US" smtClean="0"/>
-              <a:t>10/21/20</a:t>
+              <a:t>10/25/2020</a:t>
             </a:fld>
             <a:endParaRPr lang="en-US"/>
           </a:p>
@@ -3810,7 +4448,7 @@
           <a:p>
             <a:fld id="{02AC24A9-CCB6-4F8D-B8DB-C2F3692CFA5A}" type="datetimeFigureOut">
               <a:rPr lang="en-US" smtClean="0"/>
-              <a:t>10/21/20</a:t>
+              <a:t>10/25/2020</a:t>
             </a:fld>
             <a:endParaRPr lang="en-US"/>
           </a:p>
@@ -4509,7 +5147,7 @@
           <a:p>
             <a:fld id="{02AC24A9-CCB6-4F8D-B8DB-C2F3692CFA5A}" type="datetimeFigureOut">
               <a:rPr lang="en-US" smtClean="0"/>
-              <a:t>10/21/20</a:t>
+              <a:t>10/25/2020</a:t>
             </a:fld>
             <a:endParaRPr lang="en-US"/>
           </a:p>
@@ -4838,7 +5476,7 @@
           <a:p>
             <a:fld id="{02AC24A9-CCB6-4F8D-B8DB-C2F3692CFA5A}" type="datetimeFigureOut">
               <a:rPr lang="en-US" smtClean="0"/>
-              <a:t>10/21/20</a:t>
+              <a:t>10/25/2020</a:t>
             </a:fld>
             <a:endParaRPr lang="en-US"/>
           </a:p>
@@ -4951,7 +5589,7 @@
           <a:p>
             <a:fld id="{02AC24A9-CCB6-4F8D-B8DB-C2F3692CFA5A}" type="datetimeFigureOut">
               <a:rPr lang="en-US" smtClean="0"/>
-              <a:t>10/21/20</a:t>
+              <a:t>10/25/2020</a:t>
             </a:fld>
             <a:endParaRPr lang="en-US"/>
           </a:p>
@@ -5446,7 +6084,7 @@
           <a:p>
             <a:fld id="{02AC24A9-CCB6-4F8D-B8DB-C2F3692CFA5A}" type="datetimeFigureOut">
               <a:rPr lang="en-US" smtClean="0"/>
-              <a:t>10/21/20</a:t>
+              <a:t>10/25/2020</a:t>
             </a:fld>
             <a:endParaRPr lang="en-US" dirty="0"/>
           </a:p>
@@ -5923,7 +6561,7 @@
           <a:p>
             <a:fld id="{02AC24A9-CCB6-4F8D-B8DB-C2F3692CFA5A}" type="datetimeFigureOut">
               <a:rPr lang="en-US" smtClean="0"/>
-              <a:t>10/21/20</a:t>
+              <a:t>10/25/2020</a:t>
             </a:fld>
             <a:endParaRPr lang="en-US"/>
           </a:p>
@@ -6166,7 +6804,7 @@
           <a:p>
             <a:fld id="{02AC24A9-CCB6-4F8D-B8DB-C2F3692CFA5A}" type="datetimeFigureOut">
               <a:rPr lang="en-US" smtClean="0"/>
-              <a:t>10/21/20</a:t>
+              <a:t>10/25/2020</a:t>
             </a:fld>
             <a:endParaRPr lang="en-US"/>
           </a:p>
@@ -7051,6 +7689,422 @@
 <file path=ppt/slides/slide10.xml><?xml version="1.0" encoding="utf-8"?>
 <p:sld xmlns:a="http://schemas.openxmlformats.org/drawingml/2006/main" xmlns:r="http://schemas.openxmlformats.org/officeDocument/2006/relationships" xmlns:p="http://schemas.openxmlformats.org/presentationml/2006/main">
   <p:cSld>
+    <p:spTree>
+      <p:nvGrpSpPr>
+        <p:cNvPr id="1" name=""/>
+        <p:cNvGrpSpPr/>
+        <p:nvPr/>
+      </p:nvGrpSpPr>
+      <p:grpSpPr>
+        <a:xfrm>
+          <a:off x="0" y="0"/>
+          <a:ext cx="0" cy="0"/>
+          <a:chOff x="0" y="0"/>
+          <a:chExt cx="0" cy="0"/>
+        </a:xfrm>
+      </p:grpSpPr>
+      <p:sp>
+        <p:nvSpPr>
+          <p:cNvPr id="2" name="Title 1">
+            <a:extLst>
+              <a:ext uri="{FF2B5EF4-FFF2-40B4-BE49-F238E27FC236}">
+                <a16:creationId xmlns:a16="http://schemas.microsoft.com/office/drawing/2014/main" id="{AB5654B1-EC79-7440-AFA8-667978E479D7}"/>
+              </a:ext>
+            </a:extLst>
+          </p:cNvPr>
+          <p:cNvSpPr>
+            <a:spLocks noGrp="1"/>
+          </p:cNvSpPr>
+          <p:nvPr>
+            <p:ph type="title"/>
+          </p:nvPr>
+        </p:nvSpPr>
+        <p:spPr>
+          <a:xfrm>
+            <a:off x="838200" y="253397"/>
+            <a:ext cx="10515600" cy="1091927"/>
+          </a:xfrm>
+        </p:spPr>
+        <p:txBody>
+          <a:bodyPr>
+            <a:normAutofit/>
+          </a:bodyPr>
+          <a:lstStyle/>
+          <a:p>
+            <a:r>
+              <a:rPr lang="en-US" dirty="0"/>
+              <a:t>Residual vs Fitted Plot</a:t>
+            </a:r>
+          </a:p>
+        </p:txBody>
+      </p:sp>
+      <p:pic>
+        <p:nvPicPr>
+          <p:cNvPr id="4" name="Picture 3" descr="Chart, scatter chart&#10;&#10;Description automatically generated">
+            <a:extLst>
+              <a:ext uri="{FF2B5EF4-FFF2-40B4-BE49-F238E27FC236}">
+                <a16:creationId xmlns:a16="http://schemas.microsoft.com/office/drawing/2014/main" id="{D9F341B3-B670-4A17-B726-14F51BCF4D22}"/>
+              </a:ext>
+            </a:extLst>
+          </p:cNvPr>
+          <p:cNvPicPr>
+            <a:picLocks noChangeAspect="1"/>
+          </p:cNvPicPr>
+          <p:nvPr/>
+        </p:nvPicPr>
+        <p:blipFill>
+          <a:blip r:embed="rId3"/>
+          <a:stretch>
+            <a:fillRect/>
+          </a:stretch>
+        </p:blipFill>
+        <p:spPr>
+          <a:xfrm>
+            <a:off x="2618031" y="2134818"/>
+            <a:ext cx="7032231" cy="4581292"/>
+          </a:xfrm>
+          <a:prstGeom prst="rect">
+            <a:avLst/>
+          </a:prstGeom>
+        </p:spPr>
+      </p:pic>
+    </p:spTree>
+    <p:extLst>
+      <p:ext uri="{BB962C8B-B14F-4D97-AF65-F5344CB8AC3E}">
+        <p14:creationId xmlns:p14="http://schemas.microsoft.com/office/powerpoint/2010/main" val="53215945"/>
+      </p:ext>
+    </p:extLst>
+  </p:cSld>
+  <p:clrMapOvr>
+    <a:masterClrMapping/>
+  </p:clrMapOvr>
+</p:sld>
+</file>
+
+<file path=ppt/slides/slide11.xml><?xml version="1.0" encoding="utf-8"?>
+<p:sld xmlns:a="http://schemas.openxmlformats.org/drawingml/2006/main" xmlns:r="http://schemas.openxmlformats.org/officeDocument/2006/relationships" xmlns:p="http://schemas.openxmlformats.org/presentationml/2006/main">
+  <p:cSld>
+    <p:spTree>
+      <p:nvGrpSpPr>
+        <p:cNvPr id="1" name=""/>
+        <p:cNvGrpSpPr/>
+        <p:nvPr/>
+      </p:nvGrpSpPr>
+      <p:grpSpPr>
+        <a:xfrm>
+          <a:off x="0" y="0"/>
+          <a:ext cx="0" cy="0"/>
+          <a:chOff x="0" y="0"/>
+          <a:chExt cx="0" cy="0"/>
+        </a:xfrm>
+      </p:grpSpPr>
+      <p:sp>
+        <p:nvSpPr>
+          <p:cNvPr id="2" name="Title 1">
+            <a:extLst>
+              <a:ext uri="{FF2B5EF4-FFF2-40B4-BE49-F238E27FC236}">
+                <a16:creationId xmlns:a16="http://schemas.microsoft.com/office/drawing/2014/main" id="{AB5654B1-EC79-7440-AFA8-667978E479D7}"/>
+              </a:ext>
+            </a:extLst>
+          </p:cNvPr>
+          <p:cNvSpPr>
+            <a:spLocks noGrp="1"/>
+          </p:cNvSpPr>
+          <p:nvPr>
+            <p:ph type="title"/>
+          </p:nvPr>
+        </p:nvSpPr>
+        <p:spPr>
+          <a:xfrm>
+            <a:off x="838200" y="253397"/>
+            <a:ext cx="10515600" cy="1091927"/>
+          </a:xfrm>
+        </p:spPr>
+        <p:txBody>
+          <a:bodyPr>
+            <a:normAutofit/>
+          </a:bodyPr>
+          <a:lstStyle/>
+          <a:p>
+            <a:r>
+              <a:rPr lang="en-US" dirty="0"/>
+              <a:t>Residual Randomness</a:t>
+            </a:r>
+          </a:p>
+        </p:txBody>
+      </p:sp>
+      <p:pic>
+        <p:nvPicPr>
+          <p:cNvPr id="6" name="Picture 5" descr="Chart, scatter chart&#10;&#10;Description automatically generated">
+            <a:extLst>
+              <a:ext uri="{FF2B5EF4-FFF2-40B4-BE49-F238E27FC236}">
+                <a16:creationId xmlns:a16="http://schemas.microsoft.com/office/drawing/2014/main" id="{8851B2CC-D4B8-4E5E-9AF3-7044C4AA736C}"/>
+              </a:ext>
+            </a:extLst>
+          </p:cNvPr>
+          <p:cNvPicPr>
+            <a:picLocks noChangeAspect="1"/>
+          </p:cNvPicPr>
+          <p:nvPr/>
+        </p:nvPicPr>
+        <p:blipFill>
+          <a:blip r:embed="rId3"/>
+          <a:stretch>
+            <a:fillRect/>
+          </a:stretch>
+        </p:blipFill>
+        <p:spPr>
+          <a:xfrm>
+            <a:off x="2920109" y="2148086"/>
+            <a:ext cx="6840703" cy="4456517"/>
+          </a:xfrm>
+          <a:prstGeom prst="rect">
+            <a:avLst/>
+          </a:prstGeom>
+        </p:spPr>
+      </p:pic>
+    </p:spTree>
+    <p:extLst>
+      <p:ext uri="{BB962C8B-B14F-4D97-AF65-F5344CB8AC3E}">
+        <p14:creationId xmlns:p14="http://schemas.microsoft.com/office/powerpoint/2010/main" val="123923511"/>
+      </p:ext>
+    </p:extLst>
+  </p:cSld>
+  <p:clrMapOvr>
+    <a:masterClrMapping/>
+  </p:clrMapOvr>
+</p:sld>
+</file>
+
+<file path=ppt/slides/slide12.xml><?xml version="1.0" encoding="utf-8"?>
+<p:sld xmlns:a="http://schemas.openxmlformats.org/drawingml/2006/main" xmlns:r="http://schemas.openxmlformats.org/officeDocument/2006/relationships" xmlns:p="http://schemas.openxmlformats.org/presentationml/2006/main">
+  <p:cSld>
+    <p:spTree>
+      <p:nvGrpSpPr>
+        <p:cNvPr id="1" name=""/>
+        <p:cNvGrpSpPr/>
+        <p:nvPr/>
+      </p:nvGrpSpPr>
+      <p:grpSpPr>
+        <a:xfrm>
+          <a:off x="0" y="0"/>
+          <a:ext cx="0" cy="0"/>
+          <a:chOff x="0" y="0"/>
+          <a:chExt cx="0" cy="0"/>
+        </a:xfrm>
+      </p:grpSpPr>
+      <p:sp>
+        <p:nvSpPr>
+          <p:cNvPr id="2" name="Title 1">
+            <a:extLst>
+              <a:ext uri="{FF2B5EF4-FFF2-40B4-BE49-F238E27FC236}">
+                <a16:creationId xmlns:a16="http://schemas.microsoft.com/office/drawing/2014/main" id="{AB5654B1-EC79-7440-AFA8-667978E479D7}"/>
+              </a:ext>
+            </a:extLst>
+          </p:cNvPr>
+          <p:cNvSpPr>
+            <a:spLocks noGrp="1"/>
+          </p:cNvSpPr>
+          <p:nvPr>
+            <p:ph type="title"/>
+          </p:nvPr>
+        </p:nvSpPr>
+        <p:spPr>
+          <a:xfrm>
+            <a:off x="838200" y="253397"/>
+            <a:ext cx="10515600" cy="1091927"/>
+          </a:xfrm>
+        </p:spPr>
+        <p:txBody>
+          <a:bodyPr>
+            <a:normAutofit/>
+          </a:bodyPr>
+          <a:lstStyle/>
+          <a:p>
+            <a:r>
+              <a:rPr lang="en-US" dirty="0"/>
+              <a:t>Fitted vs Actual Plot</a:t>
+            </a:r>
+          </a:p>
+        </p:txBody>
+      </p:sp>
+      <p:pic>
+        <p:nvPicPr>
+          <p:cNvPr id="4" name="Picture 3" descr="Chart, scatter chart&#10;&#10;Description automatically generated">
+            <a:extLst>
+              <a:ext uri="{FF2B5EF4-FFF2-40B4-BE49-F238E27FC236}">
+                <a16:creationId xmlns:a16="http://schemas.microsoft.com/office/drawing/2014/main" id="{EF822DD9-9F77-431A-97AF-A612209D468C}"/>
+              </a:ext>
+            </a:extLst>
+          </p:cNvPr>
+          <p:cNvPicPr>
+            <a:picLocks noChangeAspect="1"/>
+          </p:cNvPicPr>
+          <p:nvPr/>
+        </p:nvPicPr>
+        <p:blipFill>
+          <a:blip r:embed="rId3"/>
+          <a:stretch>
+            <a:fillRect/>
+          </a:stretch>
+        </p:blipFill>
+        <p:spPr>
+          <a:xfrm>
+            <a:off x="2587797" y="2033621"/>
+            <a:ext cx="7016406" cy="4570982"/>
+          </a:xfrm>
+          <a:prstGeom prst="rect">
+            <a:avLst/>
+          </a:prstGeom>
+        </p:spPr>
+      </p:pic>
+    </p:spTree>
+    <p:extLst>
+      <p:ext uri="{BB962C8B-B14F-4D97-AF65-F5344CB8AC3E}">
+        <p14:creationId xmlns:p14="http://schemas.microsoft.com/office/powerpoint/2010/main" val="2944988631"/>
+      </p:ext>
+    </p:extLst>
+  </p:cSld>
+  <p:clrMapOvr>
+    <a:masterClrMapping/>
+  </p:clrMapOvr>
+</p:sld>
+</file>
+
+<file path=ppt/slides/slide13.xml><?xml version="1.0" encoding="utf-8"?>
+<p:sld xmlns:a="http://schemas.openxmlformats.org/drawingml/2006/main" xmlns:r="http://schemas.openxmlformats.org/officeDocument/2006/relationships" xmlns:p="http://schemas.openxmlformats.org/presentationml/2006/main">
+  <p:cSld>
+    <p:spTree>
+      <p:nvGrpSpPr>
+        <p:cNvPr id="1" name=""/>
+        <p:cNvGrpSpPr/>
+        <p:nvPr/>
+      </p:nvGrpSpPr>
+      <p:grpSpPr>
+        <a:xfrm>
+          <a:off x="0" y="0"/>
+          <a:ext cx="0" cy="0"/>
+          <a:chOff x="0" y="0"/>
+          <a:chExt cx="0" cy="0"/>
+        </a:xfrm>
+      </p:grpSpPr>
+      <p:sp>
+        <p:nvSpPr>
+          <p:cNvPr id="2" name="Title 1">
+            <a:extLst>
+              <a:ext uri="{FF2B5EF4-FFF2-40B4-BE49-F238E27FC236}">
+                <a16:creationId xmlns:a16="http://schemas.microsoft.com/office/drawing/2014/main" id="{AB5654B1-EC79-7440-AFA8-667978E479D7}"/>
+              </a:ext>
+            </a:extLst>
+          </p:cNvPr>
+          <p:cNvSpPr>
+            <a:spLocks noGrp="1"/>
+          </p:cNvSpPr>
+          <p:nvPr>
+            <p:ph type="title"/>
+          </p:nvPr>
+        </p:nvSpPr>
+        <p:spPr>
+          <a:xfrm>
+            <a:off x="838200" y="253397"/>
+            <a:ext cx="10515600" cy="1091927"/>
+          </a:xfrm>
+        </p:spPr>
+        <p:txBody>
+          <a:bodyPr>
+            <a:normAutofit/>
+          </a:bodyPr>
+          <a:lstStyle/>
+          <a:p>
+            <a:r>
+              <a:rPr lang="en-US" dirty="0"/>
+              <a:t>Influential Values</a:t>
+            </a:r>
+          </a:p>
+        </p:txBody>
+      </p:sp>
+      <p:pic>
+        <p:nvPicPr>
+          <p:cNvPr id="5" name="Picture 4" descr="Chart, scatter chart&#10;&#10;Description automatically generated">
+            <a:extLst>
+              <a:ext uri="{FF2B5EF4-FFF2-40B4-BE49-F238E27FC236}">
+                <a16:creationId xmlns:a16="http://schemas.microsoft.com/office/drawing/2014/main" id="{7A8D4DEE-2DC0-4E2A-B288-0EDA320E08B2}"/>
+              </a:ext>
+            </a:extLst>
+          </p:cNvPr>
+          <p:cNvPicPr>
+            <a:picLocks noChangeAspect="1"/>
+          </p:cNvPicPr>
+          <p:nvPr/>
+        </p:nvPicPr>
+        <p:blipFill rotWithShape="1">
+          <a:blip r:embed="rId3"/>
+          <a:srcRect t="10404" b="4419"/>
+          <a:stretch/>
+        </p:blipFill>
+        <p:spPr>
+          <a:xfrm>
+            <a:off x="1952700" y="2154620"/>
+            <a:ext cx="8286599" cy="4598275"/>
+          </a:xfrm>
+          <a:prstGeom prst="rect">
+            <a:avLst/>
+          </a:prstGeom>
+        </p:spPr>
+      </p:pic>
+      <p:sp>
+        <p:nvSpPr>
+          <p:cNvPr id="6" name="TextBox 5">
+            <a:extLst>
+              <a:ext uri="{FF2B5EF4-FFF2-40B4-BE49-F238E27FC236}">
+                <a16:creationId xmlns:a16="http://schemas.microsoft.com/office/drawing/2014/main" id="{72B605B9-E35C-42BC-9FD8-EC8912059FC8}"/>
+              </a:ext>
+            </a:extLst>
+          </p:cNvPr>
+          <p:cNvSpPr txBox="1"/>
+          <p:nvPr/>
+        </p:nvSpPr>
+        <p:spPr>
+          <a:xfrm>
+            <a:off x="7197664" y="3153102"/>
+            <a:ext cx="2419301" cy="369332"/>
+          </a:xfrm>
+          <a:prstGeom prst="rect">
+            <a:avLst/>
+          </a:prstGeom>
+          <a:noFill/>
+        </p:spPr>
+        <p:txBody>
+          <a:bodyPr wrap="square" rtlCol="0">
+            <a:spAutoFit/>
+          </a:bodyPr>
+          <a:lstStyle/>
+          <a:p>
+            <a:pPr algn="ctr"/>
+            <a:r>
+              <a:rPr lang="en-US" dirty="0"/>
+              <a:t>No influential value</a:t>
+            </a:r>
+            <a:endParaRPr lang="en-AU" dirty="0"/>
+          </a:p>
+        </p:txBody>
+      </p:sp>
+    </p:spTree>
+    <p:extLst>
+      <p:ext uri="{BB962C8B-B14F-4D97-AF65-F5344CB8AC3E}">
+        <p14:creationId xmlns:p14="http://schemas.microsoft.com/office/powerpoint/2010/main" val="2800997679"/>
+      </p:ext>
+    </p:extLst>
+  </p:cSld>
+  <p:clrMapOvr>
+    <a:masterClrMapping/>
+  </p:clrMapOvr>
+</p:sld>
+</file>
+
+<file path=ppt/slides/slide14.xml><?xml version="1.0" encoding="utf-8"?>
+<p:sld xmlns:a="http://schemas.openxmlformats.org/drawingml/2006/main" xmlns:r="http://schemas.openxmlformats.org/officeDocument/2006/relationships" xmlns:p="http://schemas.openxmlformats.org/presentationml/2006/main">
+  <p:cSld>
     <p:bg>
       <p:bgPr>
         <a:solidFill>
@@ -7501,7 +8555,7 @@
           <a:p>
             <a:r>
               <a:rPr lang="en-US" dirty="0"/>
-              <a:t>Thank you / any questions</a:t>
+              <a:t>[ live demo / storytelling with data ]</a:t>
             </a:r>
           </a:p>
         </p:txBody>
@@ -7648,7 +8702,7 @@
     </p:spTree>
     <p:extLst>
       <p:ext uri="{BB962C8B-B14F-4D97-AF65-F5344CB8AC3E}">
-        <p14:creationId xmlns:p14="http://schemas.microsoft.com/office/powerpoint/2010/main" val="693673410"/>
+        <p14:creationId xmlns:p14="http://schemas.microsoft.com/office/powerpoint/2010/main" val="834822780"/>
       </p:ext>
     </p:extLst>
   </p:cSld>
@@ -7658,7 +8712,7 @@
 </p:sld>
 </file>
 
-<file path=ppt/slides/slide11.xml><?xml version="1.0" encoding="utf-8"?>
+<file path=ppt/slides/slide15.xml><?xml version="1.0" encoding="utf-8"?>
 <p:sld xmlns:a="http://schemas.openxmlformats.org/drawingml/2006/main" xmlns:r="http://schemas.openxmlformats.org/officeDocument/2006/relationships" xmlns:p="http://schemas.openxmlformats.org/presentationml/2006/main">
   <p:cSld>
     <p:bg>
@@ -8111,7 +9165,7 @@
           <a:p>
             <a:r>
               <a:rPr lang="en-US" dirty="0"/>
-              <a:t>?References</a:t>
+              <a:t>Conclusion</a:t>
             </a:r>
           </a:p>
         </p:txBody>
@@ -8238,22 +9292,24 @@
           <a:p>
             <a:r>
               <a:rPr lang="en-US" sz="2200" dirty="0"/>
-              <a:t>Maybe we should have this… maybe not.</a:t>
+              <a:t>1</a:t>
             </a:r>
           </a:p>
           <a:p>
             <a:r>
               <a:rPr lang="en-US" sz="2200" dirty="0"/>
-              <a:t>Would be along lines of what’s requested in project specification document: “An appendix listing the names and sources of the data sets as well as code libraries, or tools you used in your project”</a:t>
+              <a:t>2</a:t>
             </a:r>
           </a:p>
           <a:p>
             <a:r>
               <a:rPr lang="en-US" sz="2200" dirty="0"/>
-              <a:t>Could be too much to fit on a slide.</a:t>
+              <a:t>To improve understanding of how the budget was decided, more details and data would be required, such as business and economic data, Queensland-related federal budget</a:t>
             </a:r>
-          </a:p>
-          <a:p>
+            <a:r>
+              <a:rPr lang="en-US" sz="2200"/>
+              <a:t>, immigration data</a:t>
+            </a:r>
             <a:endParaRPr lang="en-US" sz="2200" dirty="0"/>
           </a:p>
         </p:txBody>
@@ -8261,7 +9317,7 @@
     </p:spTree>
     <p:extLst>
       <p:ext uri="{BB962C8B-B14F-4D97-AF65-F5344CB8AC3E}">
-        <p14:creationId xmlns:p14="http://schemas.microsoft.com/office/powerpoint/2010/main" val="1654414743"/>
+        <p14:creationId xmlns:p14="http://schemas.microsoft.com/office/powerpoint/2010/main" val="2913327060"/>
       </p:ext>
     </p:extLst>
   </p:cSld>
@@ -8271,7 +9327,7 @@
 </p:sld>
 </file>
 
-<file path=ppt/slides/slide2.xml><?xml version="1.0" encoding="utf-8"?>
+<file path=ppt/slides/slide16.xml><?xml version="1.0" encoding="utf-8"?>
 <p:sld xmlns:a="http://schemas.openxmlformats.org/drawingml/2006/main" xmlns:r="http://schemas.openxmlformats.org/officeDocument/2006/relationships" xmlns:p="http://schemas.openxmlformats.org/presentationml/2006/main">
   <p:cSld>
     <p:bg>
@@ -8724,7 +9780,7 @@
           <a:p>
             <a:r>
               <a:rPr lang="en-US" dirty="0"/>
-              <a:t>Group 8</a:t>
+              <a:t>Thank you / any questions</a:t>
             </a:r>
           </a:p>
         </p:txBody>
@@ -8850,32 +9906,20 @@
           <a:lstStyle/>
           <a:p>
             <a:r>
-              <a:rPr lang="en-US" sz="2200"/>
-              <a:t>Siamak Adeli Koodehi</a:t>
+              <a:rPr lang="en-US" sz="2200" dirty="0"/>
+              <a:t>1</a:t>
             </a:r>
           </a:p>
           <a:p>
             <a:r>
-              <a:rPr lang="en-US" sz="2200"/>
-              <a:t>Cristhyan Cardona Garcia</a:t>
+              <a:rPr lang="en-US" sz="2200" dirty="0"/>
+              <a:t>2</a:t>
             </a:r>
           </a:p>
           <a:p>
             <a:r>
-              <a:rPr lang="en-US" sz="2200"/>
-              <a:t>Matthew Colwell</a:t>
-            </a:r>
-          </a:p>
-          <a:p>
-            <a:r>
-              <a:rPr lang="en-US" sz="2200"/>
-              <a:t>Christopher Symons</a:t>
-            </a:r>
-          </a:p>
-          <a:p>
-            <a:r>
-              <a:rPr lang="en-US" sz="2200"/>
-              <a:t>Hai Hung Vu</a:t>
+              <a:rPr lang="en-US" sz="2200" dirty="0"/>
+              <a:t>3</a:t>
             </a:r>
           </a:p>
         </p:txBody>
@@ -8883,7 +9927,7 @@
     </p:spTree>
     <p:extLst>
       <p:ext uri="{BB962C8B-B14F-4D97-AF65-F5344CB8AC3E}">
-        <p14:creationId xmlns:p14="http://schemas.microsoft.com/office/powerpoint/2010/main" val="2974082033"/>
+        <p14:creationId xmlns:p14="http://schemas.microsoft.com/office/powerpoint/2010/main" val="693673410"/>
       </p:ext>
     </p:extLst>
   </p:cSld>
@@ -8893,7 +9937,7 @@
 </p:sld>
 </file>
 
-<file path=ppt/slides/slide3.xml><?xml version="1.0" encoding="utf-8"?>
+<file path=ppt/slides/slide17.xml><?xml version="1.0" encoding="utf-8"?>
 <p:sld xmlns:a="http://schemas.openxmlformats.org/drawingml/2006/main" xmlns:r="http://schemas.openxmlformats.org/officeDocument/2006/relationships" xmlns:p="http://schemas.openxmlformats.org/presentationml/2006/main">
   <p:cSld>
     <p:bg>
@@ -9346,7 +10390,7 @@
           <a:p>
             <a:r>
               <a:rPr lang="en-US" dirty="0"/>
-              <a:t>The Problem (Solving with Data)</a:t>
+              <a:t>?References</a:t>
             </a:r>
           </a:p>
         </p:txBody>
@@ -9473,27 +10517,30 @@
           <a:p>
             <a:r>
               <a:rPr lang="en-US" sz="2200" dirty="0"/>
-              <a:t>1</a:t>
+              <a:t>Maybe we should have this… maybe not.</a:t>
             </a:r>
           </a:p>
           <a:p>
             <a:r>
               <a:rPr lang="en-US" sz="2200" dirty="0"/>
-              <a:t>2</a:t>
+              <a:t>Would be along lines of what’s requested in project specification document: “An appendix listing the names and sources of the data sets as well as code libraries, or tools you used in your project”</a:t>
             </a:r>
           </a:p>
           <a:p>
             <a:r>
               <a:rPr lang="en-US" sz="2200" dirty="0"/>
-              <a:t>3</a:t>
+              <a:t>Could be too much to fit on a slide.</a:t>
             </a:r>
+          </a:p>
+          <a:p>
+            <a:endParaRPr lang="en-US" sz="2200" dirty="0"/>
           </a:p>
         </p:txBody>
       </p:sp>
     </p:spTree>
     <p:extLst>
       <p:ext uri="{BB962C8B-B14F-4D97-AF65-F5344CB8AC3E}">
-        <p14:creationId xmlns:p14="http://schemas.microsoft.com/office/powerpoint/2010/main" val="4200848663"/>
+        <p14:creationId xmlns:p14="http://schemas.microsoft.com/office/powerpoint/2010/main" val="1654414743"/>
       </p:ext>
     </p:extLst>
   </p:cSld>
@@ -9503,7 +10550,7 @@
 </p:sld>
 </file>
 
-<file path=ppt/slides/slide4.xml><?xml version="1.0" encoding="utf-8"?>
+<file path=ppt/slides/slide2.xml><?xml version="1.0" encoding="utf-8"?>
 <p:sld xmlns:a="http://schemas.openxmlformats.org/drawingml/2006/main" xmlns:r="http://schemas.openxmlformats.org/officeDocument/2006/relationships" xmlns:p="http://schemas.openxmlformats.org/presentationml/2006/main">
   <p:cSld>
     <p:bg>
@@ -9956,7 +11003,7 @@
           <a:p>
             <a:r>
               <a:rPr lang="en-US" dirty="0"/>
-              <a:t>[ initial live demo of web tool here ]</a:t>
+              <a:t>Group 8</a:t>
             </a:r>
           </a:p>
         </p:txBody>
@@ -10082,20 +11129,32 @@
           <a:lstStyle/>
           <a:p>
             <a:r>
-              <a:rPr lang="en-US" sz="2200" dirty="0"/>
-              <a:t>1</a:t>
+              <a:rPr lang="en-US" sz="2200"/>
+              <a:t>Siamak Adeli Koodehi</a:t>
             </a:r>
           </a:p>
           <a:p>
             <a:r>
-              <a:rPr lang="en-US" sz="2200" dirty="0"/>
-              <a:t>2</a:t>
+              <a:rPr lang="en-US" sz="2200"/>
+              <a:t>Cristhyan Cardona Garcia</a:t>
             </a:r>
           </a:p>
           <a:p>
             <a:r>
-              <a:rPr lang="en-US" sz="2200" dirty="0"/>
-              <a:t>3</a:t>
+              <a:rPr lang="en-US" sz="2200"/>
+              <a:t>Matthew Colwell</a:t>
+            </a:r>
+          </a:p>
+          <a:p>
+            <a:r>
+              <a:rPr lang="en-US" sz="2200"/>
+              <a:t>Christopher Symons</a:t>
+            </a:r>
+          </a:p>
+          <a:p>
+            <a:r>
+              <a:rPr lang="en-US" sz="2200"/>
+              <a:t>Hai Hung Vu</a:t>
             </a:r>
           </a:p>
         </p:txBody>
@@ -10103,7 +11162,7 @@
     </p:spTree>
     <p:extLst>
       <p:ext uri="{BB962C8B-B14F-4D97-AF65-F5344CB8AC3E}">
-        <p14:creationId xmlns:p14="http://schemas.microsoft.com/office/powerpoint/2010/main" val="11027945"/>
+        <p14:creationId xmlns:p14="http://schemas.microsoft.com/office/powerpoint/2010/main" val="2974082033"/>
       </p:ext>
     </p:extLst>
   </p:cSld>
@@ -10113,7 +11172,7 @@
 </p:sld>
 </file>
 
-<file path=ppt/slides/slide5.xml><?xml version="1.0" encoding="utf-8"?>
+<file path=ppt/slides/slide3.xml><?xml version="1.0" encoding="utf-8"?>
 <p:sld xmlns:a="http://schemas.openxmlformats.org/drawingml/2006/main" xmlns:r="http://schemas.openxmlformats.org/officeDocument/2006/relationships" xmlns:p="http://schemas.openxmlformats.org/presentationml/2006/main">
   <p:cSld>
     <p:bg>
@@ -10566,7 +11625,7 @@
           <a:p>
             <a:r>
               <a:rPr lang="en-US" dirty="0"/>
-              <a:t>Getting the Data (I need)</a:t>
+              <a:t>The Problem (Solving with Data)</a:t>
             </a:r>
           </a:p>
         </p:txBody>
@@ -10713,7 +11772,7 @@
     </p:spTree>
     <p:extLst>
       <p:ext uri="{BB962C8B-B14F-4D97-AF65-F5344CB8AC3E}">
-        <p14:creationId xmlns:p14="http://schemas.microsoft.com/office/powerpoint/2010/main" val="124067418"/>
+        <p14:creationId xmlns:p14="http://schemas.microsoft.com/office/powerpoint/2010/main" val="4200848663"/>
       </p:ext>
     </p:extLst>
   </p:cSld>
@@ -10723,7 +11782,7 @@
 </p:sld>
 </file>
 
-<file path=ppt/slides/slide6.xml><?xml version="1.0" encoding="utf-8"?>
+<file path=ppt/slides/slide4.xml><?xml version="1.0" encoding="utf-8"?>
 <p:sld xmlns:a="http://schemas.openxmlformats.org/drawingml/2006/main" xmlns:r="http://schemas.openxmlformats.org/officeDocument/2006/relationships" xmlns:p="http://schemas.openxmlformats.org/presentationml/2006/main">
   <p:cSld>
     <p:bg>
@@ -11176,7 +12235,7 @@
           <a:p>
             <a:r>
               <a:rPr lang="en-US" dirty="0"/>
-              <a:t>Is my data fit for use?</a:t>
+              <a:t>[ initial live demo of web tool here ]</a:t>
             </a:r>
           </a:p>
         </p:txBody>
@@ -11323,7 +12382,7 @@
     </p:spTree>
     <p:extLst>
       <p:ext uri="{BB962C8B-B14F-4D97-AF65-F5344CB8AC3E}">
-        <p14:creationId xmlns:p14="http://schemas.microsoft.com/office/powerpoint/2010/main" val="1718744964"/>
+        <p14:creationId xmlns:p14="http://schemas.microsoft.com/office/powerpoint/2010/main" val="11027945"/>
       </p:ext>
     </p:extLst>
   </p:cSld>
@@ -11333,7 +12392,7 @@
 </p:sld>
 </file>
 
-<file path=ppt/slides/slide7.xml><?xml version="1.0" encoding="utf-8"?>
+<file path=ppt/slides/slide5.xml><?xml version="1.0" encoding="utf-8"?>
 <p:sld xmlns:a="http://schemas.openxmlformats.org/drawingml/2006/main" xmlns:r="http://schemas.openxmlformats.org/officeDocument/2006/relationships" xmlns:p="http://schemas.openxmlformats.org/presentationml/2006/main">
   <p:cSld>
     <p:bg>
@@ -11786,7 +12845,7 @@
           <a:p>
             <a:r>
               <a:rPr lang="en-US" dirty="0"/>
-              <a:t>Making the data confess</a:t>
+              <a:t>Getting the Data (I need)</a:t>
             </a:r>
           </a:p>
         </p:txBody>
@@ -11901,8 +12960,8 @@
         </p:nvSpPr>
         <p:spPr>
           <a:xfrm>
-            <a:off x="838200" y="2478024"/>
-            <a:ext cx="10515600" cy="3694176"/>
+            <a:off x="556314" y="1899601"/>
+            <a:ext cx="10797486" cy="4272599"/>
           </a:xfrm>
         </p:spPr>
         <p:txBody>
@@ -11912,28 +12971,39 @@
           <a:lstStyle/>
           <a:p>
             <a:r>
-              <a:rPr lang="en-US" sz="2200" dirty="0"/>
-              <a:t>1</a:t>
+              <a:rPr lang="en-US" sz="1800" dirty="0"/>
+              <a:t>2016 Census data consists of more than 15,000 features for 89 State Electoral Divisions. Initial EDA and feature selection was carried out based on its metadata. Transformation of demographic data by merging into three major age groups (under 20, 21-65, over 65)</a:t>
             </a:r>
           </a:p>
           <a:p>
             <a:r>
-              <a:rPr lang="en-US" sz="2200" dirty="0"/>
-              <a:t>2</a:t>
+              <a:rPr lang="en-US" sz="1800" dirty="0"/>
+              <a:t>16 inconsistencies between 2016 and 2017 SED names due to an electoral boundary redistribution prior to the election. The names were reconciled by estimating Census data for new 2017 electorates.</a:t>
             </a:r>
           </a:p>
           <a:p>
+            <a:pPr lvl="1"/>
             <a:r>
-              <a:rPr lang="en-US" sz="2200" dirty="0"/>
-              <a:t>3</a:t>
+              <a:rPr lang="en-US" sz="1600" dirty="0"/>
+              <a:t>Some were just direct name changes</a:t>
             </a:r>
+          </a:p>
+          <a:p>
+            <a:pPr lvl="1"/>
+            <a:r>
+              <a:rPr lang="en-US" sz="1600" dirty="0"/>
+              <a:t>Some were formed by combing or transferring parts of old electorate. Averaging method was used to estimate Census data</a:t>
+            </a:r>
+          </a:p>
+          <a:p>
+            <a:endParaRPr lang="en-US" sz="1800" dirty="0"/>
           </a:p>
         </p:txBody>
       </p:sp>
     </p:spTree>
     <p:extLst>
       <p:ext uri="{BB962C8B-B14F-4D97-AF65-F5344CB8AC3E}">
-        <p14:creationId xmlns:p14="http://schemas.microsoft.com/office/powerpoint/2010/main" val="2238465027"/>
+        <p14:creationId xmlns:p14="http://schemas.microsoft.com/office/powerpoint/2010/main" val="124067418"/>
       </p:ext>
     </p:extLst>
   </p:cSld>
@@ -11943,7 +13013,7 @@
 </p:sld>
 </file>
 
-<file path=ppt/slides/slide8.xml><?xml version="1.0" encoding="utf-8"?>
+<file path=ppt/slides/slide6.xml><?xml version="1.0" encoding="utf-8"?>
 <p:sld xmlns:a="http://schemas.openxmlformats.org/drawingml/2006/main" xmlns:r="http://schemas.openxmlformats.org/officeDocument/2006/relationships" xmlns:p="http://schemas.openxmlformats.org/presentationml/2006/main">
   <p:cSld>
     <p:bg>
@@ -12396,7 +13466,7 @@
           <a:p>
             <a:r>
               <a:rPr lang="en-US" dirty="0"/>
-              <a:t>[ live demo / storytelling with data ]</a:t>
+              <a:t>Is my data fit for use?</a:t>
             </a:r>
           </a:p>
         </p:txBody>
@@ -12543,7 +13613,7 @@
     </p:spTree>
     <p:extLst>
       <p:ext uri="{BB962C8B-B14F-4D97-AF65-F5344CB8AC3E}">
-        <p14:creationId xmlns:p14="http://schemas.microsoft.com/office/powerpoint/2010/main" val="834822780"/>
+        <p14:creationId xmlns:p14="http://schemas.microsoft.com/office/powerpoint/2010/main" val="1718744964"/>
       </p:ext>
     </p:extLst>
   </p:cSld>
@@ -12553,7 +13623,175 @@
 </p:sld>
 </file>
 
-<file path=ppt/slides/slide9.xml><?xml version="1.0" encoding="utf-8"?>
+<file path=ppt/slides/slide7.xml><?xml version="1.0" encoding="utf-8"?>
+<p:sld xmlns:a="http://schemas.openxmlformats.org/drawingml/2006/main" xmlns:r="http://schemas.openxmlformats.org/officeDocument/2006/relationships" xmlns:p="http://schemas.openxmlformats.org/presentationml/2006/main">
+  <p:cSld>
+    <p:spTree>
+      <p:nvGrpSpPr>
+        <p:cNvPr id="1" name=""/>
+        <p:cNvGrpSpPr/>
+        <p:nvPr/>
+      </p:nvGrpSpPr>
+      <p:grpSpPr>
+        <a:xfrm>
+          <a:off x="0" y="0"/>
+          <a:ext cx="0" cy="0"/>
+          <a:chOff x="0" y="0"/>
+          <a:chExt cx="0" cy="0"/>
+        </a:xfrm>
+      </p:grpSpPr>
+      <p:sp>
+        <p:nvSpPr>
+          <p:cNvPr id="2" name="Title 1">
+            <a:extLst>
+              <a:ext uri="{FF2B5EF4-FFF2-40B4-BE49-F238E27FC236}">
+                <a16:creationId xmlns:a16="http://schemas.microsoft.com/office/drawing/2014/main" id="{AB5654B1-EC79-7440-AFA8-667978E479D7}"/>
+              </a:ext>
+            </a:extLst>
+          </p:cNvPr>
+          <p:cNvSpPr>
+            <a:spLocks noGrp="1"/>
+          </p:cNvSpPr>
+          <p:nvPr>
+            <p:ph type="title"/>
+          </p:nvPr>
+        </p:nvSpPr>
+        <p:spPr>
+          <a:xfrm>
+            <a:off x="838200" y="253397"/>
+            <a:ext cx="10515600" cy="1273233"/>
+          </a:xfrm>
+        </p:spPr>
+        <p:txBody>
+          <a:bodyPr>
+            <a:normAutofit/>
+          </a:bodyPr>
+          <a:lstStyle/>
+          <a:p>
+            <a:r>
+              <a:rPr lang="en-US" dirty="0"/>
+              <a:t>Multiple Linear Regression Model</a:t>
+            </a:r>
+          </a:p>
+        </p:txBody>
+      </p:sp>
+      <p:sp>
+        <p:nvSpPr>
+          <p:cNvPr id="3" name="Content Placeholder 2">
+            <a:extLst>
+              <a:ext uri="{FF2B5EF4-FFF2-40B4-BE49-F238E27FC236}">
+                <a16:creationId xmlns:a16="http://schemas.microsoft.com/office/drawing/2014/main" id="{3E82D625-45B9-8A45-88AC-E698C4EE3793}"/>
+              </a:ext>
+            </a:extLst>
+          </p:cNvPr>
+          <p:cNvSpPr>
+            <a:spLocks noGrp="1"/>
+          </p:cNvSpPr>
+          <p:nvPr>
+            <p:ph idx="1"/>
+          </p:nvPr>
+        </p:nvSpPr>
+        <p:spPr>
+          <a:xfrm>
+            <a:off x="755211" y="1899601"/>
+            <a:ext cx="10515600" cy="4001960"/>
+          </a:xfrm>
+        </p:spPr>
+        <p:txBody>
+          <a:bodyPr>
+            <a:normAutofit/>
+          </a:bodyPr>
+          <a:lstStyle/>
+          <a:p>
+            <a:r>
+              <a:rPr lang="en-US" sz="1800" dirty="0"/>
+              <a:t>Log-transformed the response variable (</a:t>
+            </a:r>
+            <a:r>
+              <a:rPr lang="en-US" sz="1800" dirty="0" err="1"/>
+              <a:t>TotalEstimateCost</a:t>
+            </a:r>
+            <a:r>
+              <a:rPr lang="en-US" sz="1800" dirty="0"/>
+              <a:t>)</a:t>
+            </a:r>
+          </a:p>
+          <a:p>
+            <a:r>
+              <a:rPr lang="en-US" sz="1800" dirty="0"/>
+              <a:t>A multiple linear regression model was fitted with 6 explanatory variables, of which </a:t>
+            </a:r>
+            <a:r>
+              <a:rPr lang="en-US" sz="1800" dirty="0" err="1"/>
+              <a:t>Working_Age</a:t>
+            </a:r>
+            <a:r>
+              <a:rPr lang="en-US" sz="1800" dirty="0"/>
+              <a:t> and </a:t>
+            </a:r>
+            <a:r>
+              <a:rPr lang="en-US" sz="1800" dirty="0" err="1"/>
+              <a:t>isALP</a:t>
+            </a:r>
+            <a:r>
+              <a:rPr lang="en-US" sz="1800" dirty="0"/>
+              <a:t> appear to be statistically significant</a:t>
+            </a:r>
+          </a:p>
+          <a:p>
+            <a:r>
+              <a:rPr lang="en-US" sz="1800" dirty="0"/>
+              <a:t>Results are below</a:t>
+            </a:r>
+          </a:p>
+          <a:p>
+            <a:endParaRPr lang="en-US" sz="1800" dirty="0"/>
+          </a:p>
+        </p:txBody>
+      </p:sp>
+      <p:pic>
+        <p:nvPicPr>
+          <p:cNvPr id="4" name="Picture 3">
+            <a:extLst>
+              <a:ext uri="{FF2B5EF4-FFF2-40B4-BE49-F238E27FC236}">
+                <a16:creationId xmlns:a16="http://schemas.microsoft.com/office/drawing/2014/main" id="{C9FB3C6E-FE21-4372-A484-B0168A78D642}"/>
+              </a:ext>
+            </a:extLst>
+          </p:cNvPr>
+          <p:cNvPicPr>
+            <a:picLocks noChangeAspect="1"/>
+          </p:cNvPicPr>
+          <p:nvPr/>
+        </p:nvPicPr>
+        <p:blipFill rotWithShape="1">
+          <a:blip r:embed="rId3"/>
+          <a:srcRect t="19083"/>
+          <a:stretch/>
+        </p:blipFill>
+        <p:spPr>
+          <a:xfrm>
+            <a:off x="3324708" y="3146598"/>
+            <a:ext cx="6126345" cy="3127934"/>
+          </a:xfrm>
+          <a:prstGeom prst="rect">
+            <a:avLst/>
+          </a:prstGeom>
+        </p:spPr>
+      </p:pic>
+    </p:spTree>
+    <p:extLst>
+      <p:ext uri="{BB962C8B-B14F-4D97-AF65-F5344CB8AC3E}">
+        <p14:creationId xmlns:p14="http://schemas.microsoft.com/office/powerpoint/2010/main" val="3480622306"/>
+      </p:ext>
+    </p:extLst>
+  </p:cSld>
+  <p:clrMapOvr>
+    <a:masterClrMapping/>
+  </p:clrMapOvr>
+</p:sld>
+</file>
+
+<file path=ppt/slides/slide8.xml><?xml version="1.0" encoding="utf-8"?>
 <p:sld xmlns:a="http://schemas.openxmlformats.org/drawingml/2006/main" xmlns:r="http://schemas.openxmlformats.org/officeDocument/2006/relationships" xmlns:p="http://schemas.openxmlformats.org/presentationml/2006/main">
   <p:cSld>
     <p:bg>
@@ -13006,7 +14244,7 @@
           <a:p>
             <a:r>
               <a:rPr lang="en-US" dirty="0"/>
-              <a:t>Conclusion</a:t>
+              <a:t>Assumption Validation and Interpretation</a:t>
             </a:r>
           </a:p>
         </p:txBody>
@@ -13121,8 +14359,8 @@
         </p:nvSpPr>
         <p:spPr>
           <a:xfrm>
-            <a:off x="838200" y="2478024"/>
-            <a:ext cx="10515600" cy="3694176"/>
+            <a:off x="755211" y="1899601"/>
+            <a:ext cx="10515600" cy="4001960"/>
           </a:xfrm>
         </p:spPr>
         <p:txBody>
@@ -13132,20 +14370,20 @@
           <a:lstStyle/>
           <a:p>
             <a:r>
-              <a:rPr lang="en-US" sz="2200" dirty="0"/>
-              <a:t>1</a:t>
+              <a:rPr lang="en-US" sz="1800" dirty="0"/>
+              <a:t>Model assumptions on residual were validated and proved to be reasonably held based on various plots</a:t>
             </a:r>
           </a:p>
           <a:p>
             <a:r>
-              <a:rPr lang="en-US" sz="2200" dirty="0"/>
-              <a:t>2</a:t>
+              <a:rPr lang="en-US" sz="1800" dirty="0"/>
+              <a:t>The model shows strong relationship between how much was spent and proportion of the working age group (21-65 years old)</a:t>
             </a:r>
           </a:p>
           <a:p>
             <a:r>
-              <a:rPr lang="en-US" sz="2200" dirty="0"/>
-              <a:t>3</a:t>
+              <a:rPr lang="en-US" sz="1800" dirty="0"/>
+              <a:t>Greater amount of money would be spent if ALP was elected in an electorate as compared to one where ALP was not elected</a:t>
             </a:r>
           </a:p>
         </p:txBody>
@@ -13153,7 +14391,102 @@
     </p:spTree>
     <p:extLst>
       <p:ext uri="{BB962C8B-B14F-4D97-AF65-F5344CB8AC3E}">
-        <p14:creationId xmlns:p14="http://schemas.microsoft.com/office/powerpoint/2010/main" val="2913327060"/>
+        <p14:creationId xmlns:p14="http://schemas.microsoft.com/office/powerpoint/2010/main" val="2238465027"/>
+      </p:ext>
+    </p:extLst>
+  </p:cSld>
+  <p:clrMapOvr>
+    <a:masterClrMapping/>
+  </p:clrMapOvr>
+</p:sld>
+</file>
+
+<file path=ppt/slides/slide9.xml><?xml version="1.0" encoding="utf-8"?>
+<p:sld xmlns:a="http://schemas.openxmlformats.org/drawingml/2006/main" xmlns:r="http://schemas.openxmlformats.org/officeDocument/2006/relationships" xmlns:p="http://schemas.openxmlformats.org/presentationml/2006/main">
+  <p:cSld>
+    <p:spTree>
+      <p:nvGrpSpPr>
+        <p:cNvPr id="1" name=""/>
+        <p:cNvGrpSpPr/>
+        <p:nvPr/>
+      </p:nvGrpSpPr>
+      <p:grpSpPr>
+        <a:xfrm>
+          <a:off x="0" y="0"/>
+          <a:ext cx="0" cy="0"/>
+          <a:chOff x="0" y="0"/>
+          <a:chExt cx="0" cy="0"/>
+        </a:xfrm>
+      </p:grpSpPr>
+      <p:sp>
+        <p:nvSpPr>
+          <p:cNvPr id="2" name="Title 1">
+            <a:extLst>
+              <a:ext uri="{FF2B5EF4-FFF2-40B4-BE49-F238E27FC236}">
+                <a16:creationId xmlns:a16="http://schemas.microsoft.com/office/drawing/2014/main" id="{AB5654B1-EC79-7440-AFA8-667978E479D7}"/>
+              </a:ext>
+            </a:extLst>
+          </p:cNvPr>
+          <p:cNvSpPr>
+            <a:spLocks noGrp="1"/>
+          </p:cNvSpPr>
+          <p:nvPr>
+            <p:ph type="title"/>
+          </p:nvPr>
+        </p:nvSpPr>
+        <p:spPr>
+          <a:xfrm>
+            <a:off x="838200" y="253397"/>
+            <a:ext cx="10515600" cy="1091927"/>
+          </a:xfrm>
+        </p:spPr>
+        <p:txBody>
+          <a:bodyPr>
+            <a:normAutofit/>
+          </a:bodyPr>
+          <a:lstStyle/>
+          <a:p>
+            <a:r>
+              <a:rPr lang="en-US" dirty="0"/>
+              <a:t>Residual Normality – QQ Plot</a:t>
+            </a:r>
+          </a:p>
+        </p:txBody>
+      </p:sp>
+      <p:pic>
+        <p:nvPicPr>
+          <p:cNvPr id="7" name="Picture 6" descr="Chart, scatter chart&#10;&#10;Description automatically generated">
+            <a:extLst>
+              <a:ext uri="{FF2B5EF4-FFF2-40B4-BE49-F238E27FC236}">
+                <a16:creationId xmlns:a16="http://schemas.microsoft.com/office/drawing/2014/main" id="{DBC6399E-12E0-44FB-9298-8BCBC2B8E747}"/>
+              </a:ext>
+            </a:extLst>
+          </p:cNvPr>
+          <p:cNvPicPr>
+            <a:picLocks noChangeAspect="1"/>
+          </p:cNvPicPr>
+          <p:nvPr/>
+        </p:nvPicPr>
+        <p:blipFill>
+          <a:blip r:embed="rId3"/>
+          <a:stretch>
+            <a:fillRect/>
+          </a:stretch>
+        </p:blipFill>
+        <p:spPr>
+          <a:xfrm>
+            <a:off x="2825517" y="2219592"/>
+            <a:ext cx="6970125" cy="4540831"/>
+          </a:xfrm>
+          <a:prstGeom prst="rect">
+            <a:avLst/>
+          </a:prstGeom>
+        </p:spPr>
+      </p:pic>
+    </p:spTree>
+    <p:extLst>
+      <p:ext uri="{BB962C8B-B14F-4D97-AF65-F5344CB8AC3E}">
+        <p14:creationId xmlns:p14="http://schemas.microsoft.com/office/powerpoint/2010/main" val="1862786319"/>
       </p:ext>
     </p:extLst>
   </p:cSld>

</xml_diff>